<commit_message>
pega o meu da o seu perfil ta certo
</commit_message>
<xml_diff>
--- a/slide/Icons.pptx
+++ b/slide/Icons.pptx
@@ -111,7 +111,7 @@
   </p:defaultTextStyle>
   <p:extLst>
     <p:ext uri="{EFAFB233-063F-42B5-8137-9DF3F51BA10A}">
-      <p15:sldGuideLst xmlns:p15="http://schemas.microsoft.com/office/powerpoint/2012/main" xmlns="">
+      <p15:sldGuideLst xmlns="" xmlns:p15="http://schemas.microsoft.com/office/powerpoint/2012/main">
         <p15:guide id="1" orient="horz" pos="2160">
           <p15:clr>
             <a:srgbClr val="A4A3A4"/>
@@ -210,7 +210,7 @@
           <a:p>
             <a:fld id="{8C69D028-04FB-4CAD-A94B-4DBC502A77F9}" type="datetimeFigureOut">
               <a:rPr lang="pt-BR" smtClean="0"/>
-              <a:t>24/04/2019</a:t>
+              <a:t>22/05/2019</a:t>
             </a:fld>
             <a:endParaRPr lang="pt-BR"/>
           </a:p>
@@ -740,7 +740,7 @@
           <a:p>
             <a:fld id="{0D12B9E4-E3E1-48A3-A42F-75EB1CD8D0EF}" type="datetimeFigureOut">
               <a:rPr lang="pt-BR" smtClean="0"/>
-              <a:t>24/04/2019</a:t>
+              <a:t>22/05/2019</a:t>
             </a:fld>
             <a:endParaRPr lang="pt-BR"/>
           </a:p>
@@ -908,7 +908,7 @@
           <a:p>
             <a:fld id="{0D12B9E4-E3E1-48A3-A42F-75EB1CD8D0EF}" type="datetimeFigureOut">
               <a:rPr lang="pt-BR" smtClean="0"/>
-              <a:t>24/04/2019</a:t>
+              <a:t>22/05/2019</a:t>
             </a:fld>
             <a:endParaRPr lang="pt-BR"/>
           </a:p>
@@ -1086,7 +1086,7 @@
           <a:p>
             <a:fld id="{0D12B9E4-E3E1-48A3-A42F-75EB1CD8D0EF}" type="datetimeFigureOut">
               <a:rPr lang="pt-BR" smtClean="0"/>
-              <a:t>24/04/2019</a:t>
+              <a:t>22/05/2019</a:t>
             </a:fld>
             <a:endParaRPr lang="pt-BR"/>
           </a:p>
@@ -1254,7 +1254,7 @@
           <a:p>
             <a:fld id="{0D12B9E4-E3E1-48A3-A42F-75EB1CD8D0EF}" type="datetimeFigureOut">
               <a:rPr lang="pt-BR" smtClean="0"/>
-              <a:t>24/04/2019</a:t>
+              <a:t>22/05/2019</a:t>
             </a:fld>
             <a:endParaRPr lang="pt-BR"/>
           </a:p>
@@ -1499,7 +1499,7 @@
           <a:p>
             <a:fld id="{0D12B9E4-E3E1-48A3-A42F-75EB1CD8D0EF}" type="datetimeFigureOut">
               <a:rPr lang="pt-BR" smtClean="0"/>
-              <a:t>24/04/2019</a:t>
+              <a:t>22/05/2019</a:t>
             </a:fld>
             <a:endParaRPr lang="pt-BR"/>
           </a:p>
@@ -1784,7 +1784,7 @@
           <a:p>
             <a:fld id="{0D12B9E4-E3E1-48A3-A42F-75EB1CD8D0EF}" type="datetimeFigureOut">
               <a:rPr lang="pt-BR" smtClean="0"/>
-              <a:t>24/04/2019</a:t>
+              <a:t>22/05/2019</a:t>
             </a:fld>
             <a:endParaRPr lang="pt-BR"/>
           </a:p>
@@ -2203,7 +2203,7 @@
           <a:p>
             <a:fld id="{0D12B9E4-E3E1-48A3-A42F-75EB1CD8D0EF}" type="datetimeFigureOut">
               <a:rPr lang="pt-BR" smtClean="0"/>
-              <a:t>24/04/2019</a:t>
+              <a:t>22/05/2019</a:t>
             </a:fld>
             <a:endParaRPr lang="pt-BR"/>
           </a:p>
@@ -2320,7 +2320,7 @@
           <a:p>
             <a:fld id="{0D12B9E4-E3E1-48A3-A42F-75EB1CD8D0EF}" type="datetimeFigureOut">
               <a:rPr lang="pt-BR" smtClean="0"/>
-              <a:t>24/04/2019</a:t>
+              <a:t>22/05/2019</a:t>
             </a:fld>
             <a:endParaRPr lang="pt-BR"/>
           </a:p>
@@ -2415,7 +2415,7 @@
           <a:p>
             <a:fld id="{0D12B9E4-E3E1-48A3-A42F-75EB1CD8D0EF}" type="datetimeFigureOut">
               <a:rPr lang="pt-BR" smtClean="0"/>
-              <a:t>24/04/2019</a:t>
+              <a:t>22/05/2019</a:t>
             </a:fld>
             <a:endParaRPr lang="pt-BR"/>
           </a:p>
@@ -2690,7 +2690,7 @@
           <a:p>
             <a:fld id="{0D12B9E4-E3E1-48A3-A42F-75EB1CD8D0EF}" type="datetimeFigureOut">
               <a:rPr lang="pt-BR" smtClean="0"/>
-              <a:t>24/04/2019</a:t>
+              <a:t>22/05/2019</a:t>
             </a:fld>
             <a:endParaRPr lang="pt-BR"/>
           </a:p>
@@ -2942,7 +2942,7 @@
           <a:p>
             <a:fld id="{0D12B9E4-E3E1-48A3-A42F-75EB1CD8D0EF}" type="datetimeFigureOut">
               <a:rPr lang="pt-BR" smtClean="0"/>
-              <a:t>24/04/2019</a:t>
+              <a:t>22/05/2019</a:t>
             </a:fld>
             <a:endParaRPr lang="pt-BR"/>
           </a:p>
@@ -3153,7 +3153,7 @@
           <a:p>
             <a:fld id="{0D12B9E4-E3E1-48A3-A42F-75EB1CD8D0EF}" type="datetimeFigureOut">
               <a:rPr lang="pt-BR" smtClean="0"/>
-              <a:t>24/04/2019</a:t>
+              <a:t>22/05/2019</a:t>
             </a:fld>
             <a:endParaRPr lang="pt-BR"/>
           </a:p>
@@ -4015,352 +4015,6 @@
           <a:chExt cx="0" cy="0"/>
         </a:xfrm>
       </p:grpSpPr>
-      <p:grpSp>
-        <p:nvGrpSpPr>
-          <p:cNvPr id="11" name="Grupo 10"/>
-          <p:cNvGrpSpPr/>
-          <p:nvPr/>
-        </p:nvGrpSpPr>
-        <p:grpSpPr>
-          <a:xfrm>
-            <a:off x="901337" y="212161"/>
-            <a:ext cx="716179" cy="823194"/>
-            <a:chOff x="3005826" y="1484784"/>
-            <a:chExt cx="3132348" cy="3600400"/>
-          </a:xfrm>
-        </p:grpSpPr>
-        <p:sp>
-          <p:nvSpPr>
-            <p:cNvPr id="8" name="Elipse 7"/>
-            <p:cNvSpPr/>
-            <p:nvPr/>
-          </p:nvSpPr>
-          <p:spPr>
-            <a:xfrm>
-              <a:off x="4031940" y="4005064"/>
-              <a:ext cx="1080120" cy="1080120"/>
-            </a:xfrm>
-            <a:prstGeom prst="ellipse">
-              <a:avLst/>
-            </a:prstGeom>
-            <a:solidFill>
-              <a:srgbClr val="FFA401"/>
-            </a:solidFill>
-            <a:ln>
-              <a:noFill/>
-            </a:ln>
-          </p:spPr>
-          <p:style>
-            <a:lnRef idx="2">
-              <a:schemeClr val="accent1">
-                <a:shade val="50000"/>
-              </a:schemeClr>
-            </a:lnRef>
-            <a:fillRef idx="1">
-              <a:schemeClr val="accent1"/>
-            </a:fillRef>
-            <a:effectRef idx="0">
-              <a:schemeClr val="accent1"/>
-            </a:effectRef>
-            <a:fontRef idx="minor">
-              <a:schemeClr val="lt1"/>
-            </a:fontRef>
-          </p:style>
-          <p:txBody>
-            <a:bodyPr rtlCol="0" anchor="ctr"/>
-            <a:lstStyle/>
-            <a:p>
-              <a:pPr algn="ctr"/>
-              <a:endParaRPr lang="pt-BR"/>
-            </a:p>
-          </p:txBody>
-        </p:sp>
-        <p:sp>
-          <p:nvSpPr>
-            <p:cNvPr id="6" name="Retângulo de cantos arredondados 5"/>
-            <p:cNvSpPr/>
-            <p:nvPr/>
-          </p:nvSpPr>
-          <p:spPr>
-            <a:xfrm>
-              <a:off x="4247964" y="1484784"/>
-              <a:ext cx="648072" cy="850595"/>
-            </a:xfrm>
-            <a:prstGeom prst="roundRect">
-              <a:avLst>
-                <a:gd name="adj" fmla="val 50000"/>
-              </a:avLst>
-            </a:prstGeom>
-            <a:solidFill>
-              <a:schemeClr val="bg1">
-                <a:lumMod val="75000"/>
-              </a:schemeClr>
-            </a:solidFill>
-            <a:ln>
-              <a:noFill/>
-            </a:ln>
-          </p:spPr>
-          <p:style>
-            <a:lnRef idx="2">
-              <a:schemeClr val="accent1">
-                <a:shade val="50000"/>
-              </a:schemeClr>
-            </a:lnRef>
-            <a:fillRef idx="1">
-              <a:schemeClr val="accent1"/>
-            </a:fillRef>
-            <a:effectRef idx="0">
-              <a:schemeClr val="accent1"/>
-            </a:effectRef>
-            <a:fontRef idx="minor">
-              <a:schemeClr val="lt1"/>
-            </a:fontRef>
-          </p:style>
-          <p:txBody>
-            <a:bodyPr rtlCol="0" anchor="ctr"/>
-            <a:lstStyle/>
-            <a:p>
-              <a:pPr algn="ctr"/>
-              <a:endParaRPr lang="pt-BR"/>
-            </a:p>
-          </p:txBody>
-        </p:sp>
-        <p:sp>
-          <p:nvSpPr>
-            <p:cNvPr id="5" name="Retângulo de cantos arredondados 4"/>
-            <p:cNvSpPr/>
-            <p:nvPr/>
-          </p:nvSpPr>
-          <p:spPr>
-            <a:xfrm>
-              <a:off x="3419872" y="1772816"/>
-              <a:ext cx="2304256" cy="2772308"/>
-            </a:xfrm>
-            <a:custGeom>
-              <a:avLst/>
-              <a:gdLst/>
-              <a:ahLst/>
-              <a:cxnLst/>
-              <a:rect l="l" t="t" r="r" b="b"/>
-              <a:pathLst>
-                <a:path w="2304256" h="2772308">
-                  <a:moveTo>
-                    <a:pt x="1152128" y="0"/>
-                  </a:moveTo>
-                  <a:cubicBezTo>
-                    <a:pt x="1788431" y="0"/>
-                    <a:pt x="2304256" y="515825"/>
-                    <a:pt x="2304256" y="1152128"/>
-                  </a:cubicBezTo>
-                  <a:lnTo>
-                    <a:pt x="2304256" y="1872208"/>
-                  </a:lnTo>
-                  <a:cubicBezTo>
-                    <a:pt x="2304256" y="2236762"/>
-                    <a:pt x="2134940" y="2561771"/>
-                    <a:pt x="1870196" y="2772308"/>
-                  </a:cubicBezTo>
-                  <a:lnTo>
-                    <a:pt x="434061" y="2772308"/>
-                  </a:lnTo>
-                  <a:cubicBezTo>
-                    <a:pt x="169317" y="2561771"/>
-                    <a:pt x="0" y="2236762"/>
-                    <a:pt x="0" y="1872208"/>
-                  </a:cubicBezTo>
-                  <a:lnTo>
-                    <a:pt x="0" y="1152128"/>
-                  </a:lnTo>
-                  <a:cubicBezTo>
-                    <a:pt x="0" y="515825"/>
-                    <a:pt x="515825" y="0"/>
-                    <a:pt x="1152128" y="0"/>
-                  </a:cubicBezTo>
-                  <a:close/>
-                </a:path>
-              </a:pathLst>
-            </a:custGeom>
-            <a:solidFill>
-              <a:srgbClr val="FFB52F"/>
-            </a:solidFill>
-            <a:ln>
-              <a:noFill/>
-            </a:ln>
-          </p:spPr>
-          <p:style>
-            <a:lnRef idx="2">
-              <a:schemeClr val="accent1">
-                <a:shade val="50000"/>
-              </a:schemeClr>
-            </a:lnRef>
-            <a:fillRef idx="1">
-              <a:schemeClr val="accent1"/>
-            </a:fillRef>
-            <a:effectRef idx="0">
-              <a:schemeClr val="accent1"/>
-            </a:effectRef>
-            <a:fontRef idx="minor">
-              <a:schemeClr val="lt1"/>
-            </a:fontRef>
-          </p:style>
-          <p:txBody>
-            <a:bodyPr rtlCol="0" anchor="ctr"/>
-            <a:lstStyle/>
-            <a:p>
-              <a:pPr algn="ctr"/>
-              <a:endParaRPr lang="pt-BR"/>
-            </a:p>
-          </p:txBody>
-        </p:sp>
-        <p:sp>
-          <p:nvSpPr>
-            <p:cNvPr id="7" name="Triângulo isósceles 6"/>
-            <p:cNvSpPr/>
-            <p:nvPr/>
-          </p:nvSpPr>
-          <p:spPr>
-            <a:xfrm>
-              <a:off x="3005826" y="1916832"/>
-              <a:ext cx="3132348" cy="2700300"/>
-            </a:xfrm>
-            <a:prstGeom prst="triangle">
-              <a:avLst/>
-            </a:prstGeom>
-            <a:solidFill>
-              <a:srgbClr val="FFB52F"/>
-            </a:solidFill>
-            <a:ln>
-              <a:noFill/>
-            </a:ln>
-          </p:spPr>
-          <p:style>
-            <a:lnRef idx="2">
-              <a:schemeClr val="accent1">
-                <a:shade val="50000"/>
-              </a:schemeClr>
-            </a:lnRef>
-            <a:fillRef idx="1">
-              <a:schemeClr val="accent1"/>
-            </a:fillRef>
-            <a:effectRef idx="0">
-              <a:schemeClr val="accent1"/>
-            </a:effectRef>
-            <a:fontRef idx="minor">
-              <a:schemeClr val="lt1"/>
-            </a:fontRef>
-          </p:style>
-          <p:txBody>
-            <a:bodyPr rtlCol="0" anchor="ctr"/>
-            <a:lstStyle/>
-            <a:p>
-              <a:pPr algn="ctr"/>
-              <a:endParaRPr lang="pt-BR"/>
-            </a:p>
-          </p:txBody>
-        </p:sp>
-        <p:sp>
-          <p:nvSpPr>
-            <p:cNvPr id="9" name="Retângulo de cantos arredondados 8"/>
-            <p:cNvSpPr/>
-            <p:nvPr/>
-          </p:nvSpPr>
-          <p:spPr>
-            <a:xfrm>
-              <a:off x="5086931" y="2553207"/>
-              <a:ext cx="358440" cy="1008112"/>
-            </a:xfrm>
-            <a:prstGeom prst="roundRect">
-              <a:avLst>
-                <a:gd name="adj" fmla="val 50000"/>
-              </a:avLst>
-            </a:prstGeom>
-            <a:solidFill>
-              <a:srgbClr val="F1EBA1"/>
-            </a:solidFill>
-            <a:ln>
-              <a:noFill/>
-            </a:ln>
-          </p:spPr>
-          <p:style>
-            <a:lnRef idx="2">
-              <a:schemeClr val="accent1">
-                <a:shade val="50000"/>
-              </a:schemeClr>
-            </a:lnRef>
-            <a:fillRef idx="1">
-              <a:schemeClr val="accent1"/>
-            </a:fillRef>
-            <a:effectRef idx="0">
-              <a:schemeClr val="accent1"/>
-            </a:effectRef>
-            <a:fontRef idx="minor">
-              <a:schemeClr val="lt1"/>
-            </a:fontRef>
-          </p:style>
-          <p:txBody>
-            <a:bodyPr rtlCol="0" anchor="ctr"/>
-            <a:lstStyle/>
-            <a:p>
-              <a:pPr algn="ctr"/>
-              <a:endParaRPr lang="pt-BR"/>
-            </a:p>
-          </p:txBody>
-        </p:sp>
-      </p:grpSp>
-      <p:sp>
-        <p:nvSpPr>
-          <p:cNvPr id="12" name="Estrela de 5 pontas 11"/>
-          <p:cNvSpPr/>
-          <p:nvPr/>
-        </p:nvSpPr>
-        <p:spPr>
-          <a:xfrm>
-            <a:off x="815948" y="1246244"/>
-            <a:ext cx="738782" cy="738782"/>
-          </a:xfrm>
-          <a:prstGeom prst="star5">
-            <a:avLst>
-              <a:gd name="adj" fmla="val 18934"/>
-              <a:gd name="hf" fmla="val 105146"/>
-              <a:gd name="vf" fmla="val 110557"/>
-            </a:avLst>
-          </a:prstGeom>
-          <a:solidFill>
-            <a:srgbClr val="F6E612"/>
-          </a:solidFill>
-          <a:ln w="28575">
-            <a:noFill/>
-          </a:ln>
-          <a:effectLst/>
-        </p:spPr>
-        <p:style>
-          <a:lnRef idx="2">
-            <a:schemeClr val="accent1">
-              <a:shade val="50000"/>
-            </a:schemeClr>
-          </a:lnRef>
-          <a:fillRef idx="1">
-            <a:schemeClr val="accent1"/>
-          </a:fillRef>
-          <a:effectRef idx="0">
-            <a:schemeClr val="accent1"/>
-          </a:effectRef>
-          <a:fontRef idx="minor">
-            <a:schemeClr val="lt1"/>
-          </a:fontRef>
-        </p:style>
-        <p:txBody>
-          <a:bodyPr rtlCol="0" anchor="ctr"/>
-          <a:lstStyle/>
-          <a:p>
-            <a:pPr algn="ctr"/>
-            <a:r>
-              <a:rPr lang="pt-BR" u="sng" dirty="0"/>
-              <a:t> </a:t>
-            </a:r>
-          </a:p>
-        </p:txBody>
-      </p:sp>
       <p:grpSp>
         <p:nvGrpSpPr>
           <p:cNvPr id="24" name="Grupo 23"/>
@@ -5085,7 +4739,7 @@
           <p:cNvPr id="42" name="Agrupar 9">
             <a:extLst>
               <a:ext uri="{FF2B5EF4-FFF2-40B4-BE49-F238E27FC236}">
-                <a16:creationId xmlns:a16="http://schemas.microsoft.com/office/drawing/2014/main" xmlns="" id="{CED1955D-3D0B-487D-AA3A-3B4047A0210A}"/>
+                <a16:creationId xmlns="" xmlns:a16="http://schemas.microsoft.com/office/drawing/2014/main" id="{CED1955D-3D0B-487D-AA3A-3B4047A0210A}"/>
               </a:ext>
             </a:extLst>
           </p:cNvPr>
@@ -5105,7 +4759,7 @@
             <p:cNvPr id="43" name="Imagem 42" descr="Uma imagem contendo objeto&#10;&#10;Descrição gerada automaticamente">
               <a:extLst>
                 <a:ext uri="{FF2B5EF4-FFF2-40B4-BE49-F238E27FC236}">
-                  <a16:creationId xmlns:a16="http://schemas.microsoft.com/office/drawing/2014/main" xmlns="" id="{1B9BA244-B9AA-4917-B819-488CA49DB1E2}"/>
+                  <a16:creationId xmlns="" xmlns:a16="http://schemas.microsoft.com/office/drawing/2014/main" id="{1B9BA244-B9AA-4917-B819-488CA49DB1E2}"/>
                 </a:ext>
               </a:extLst>
             </p:cNvPr>
@@ -5151,7 +4805,7 @@
             <p:cNvPr id="44" name="Gráfico 8" descr="Folha">
               <a:extLst>
                 <a:ext uri="{FF2B5EF4-FFF2-40B4-BE49-F238E27FC236}">
-                  <a16:creationId xmlns:a16="http://schemas.microsoft.com/office/drawing/2014/main" xmlns="" id="{D7B239DE-0B7B-4BDF-93B8-A09B4D198DF4}"/>
+                  <a16:creationId xmlns="" xmlns:a16="http://schemas.microsoft.com/office/drawing/2014/main" id="{D7B239DE-0B7B-4BDF-93B8-A09B4D198DF4}"/>
                 </a:ext>
               </a:extLst>
             </p:cNvPr>
@@ -5167,7 +4821,7 @@
                   <a14:useLocalDpi xmlns:a14="http://schemas.microsoft.com/office/drawing/2010/main" val="0"/>
                 </a:ext>
                 <a:ext uri="{96DAC541-7B7A-43D3-8B79-37D633B846F1}">
-                  <asvg:svgBlip xmlns:asvg="http://schemas.microsoft.com/office/drawing/2016/SVG/main" xmlns="" r:embed="rId6"/>
+                  <asvg:svgBlip xmlns="" xmlns:asvg="http://schemas.microsoft.com/office/drawing/2016/SVG/main" r:embed="rId6"/>
                 </a:ext>
               </a:extLst>
             </a:blip>
@@ -5209,7 +4863,7 @@
         </p:blipFill>
         <p:spPr bwMode="auto">
           <a:xfrm>
-            <a:off x="3589729" y="178337"/>
+            <a:off x="3589729" y="147306"/>
             <a:ext cx="2438400" cy="2438401"/>
           </a:xfrm>
           <a:prstGeom prst="rect">
@@ -5934,7 +5588,7 @@
           <p:cNvPr id="51" name="Agrupar 50">
             <a:extLst>
               <a:ext uri="{FF2B5EF4-FFF2-40B4-BE49-F238E27FC236}">
-                <a16:creationId xmlns:a16="http://schemas.microsoft.com/office/drawing/2014/main" xmlns="" id="{E11808A1-955C-4671-B8F9-A31BFC222774}"/>
+                <a16:creationId xmlns="" xmlns:a16="http://schemas.microsoft.com/office/drawing/2014/main" id="{E11808A1-955C-4671-B8F9-A31BFC222774}"/>
               </a:ext>
             </a:extLst>
           </p:cNvPr>
@@ -5954,7 +5608,7 @@
             <p:cNvPr id="52" name="Retângulo: Cantos Arredondados 51">
               <a:extLst>
                 <a:ext uri="{FF2B5EF4-FFF2-40B4-BE49-F238E27FC236}">
-                  <a16:creationId xmlns:a16="http://schemas.microsoft.com/office/drawing/2014/main" xmlns="" id="{E1981BA5-41E8-4A49-8859-78017A0C02AA}"/>
+                  <a16:creationId xmlns="" xmlns:a16="http://schemas.microsoft.com/office/drawing/2014/main" id="{E1981BA5-41E8-4A49-8859-78017A0C02AA}"/>
                 </a:ext>
               </a:extLst>
             </p:cNvPr>
@@ -6107,7 +5761,7 @@
             <p:cNvPr id="53" name="Retângulo: Cantos Arredondados 52">
               <a:extLst>
                 <a:ext uri="{FF2B5EF4-FFF2-40B4-BE49-F238E27FC236}">
-                  <a16:creationId xmlns:a16="http://schemas.microsoft.com/office/drawing/2014/main" xmlns="" id="{132FC1CA-61D9-4900-848D-2E69FA7CD7A7}"/>
+                  <a16:creationId xmlns="" xmlns:a16="http://schemas.microsoft.com/office/drawing/2014/main" id="{132FC1CA-61D9-4900-848D-2E69FA7CD7A7}"/>
                 </a:ext>
               </a:extLst>
             </p:cNvPr>
@@ -6260,7 +5914,7 @@
             <p:cNvPr id="54" name="Retângulo: Cantos Arredondados 53">
               <a:extLst>
                 <a:ext uri="{FF2B5EF4-FFF2-40B4-BE49-F238E27FC236}">
-                  <a16:creationId xmlns:a16="http://schemas.microsoft.com/office/drawing/2014/main" xmlns="" id="{C4D5C295-6F85-4F06-AD4F-7751CB901D98}"/>
+                  <a16:creationId xmlns="" xmlns:a16="http://schemas.microsoft.com/office/drawing/2014/main" id="{C4D5C295-6F85-4F06-AD4F-7751CB901D98}"/>
                 </a:ext>
               </a:extLst>
             </p:cNvPr>
@@ -6413,7 +6067,7 @@
             <p:cNvPr id="55" name="Forma Livre: Forma 54">
               <a:extLst>
                 <a:ext uri="{FF2B5EF4-FFF2-40B4-BE49-F238E27FC236}">
-                  <a16:creationId xmlns:a16="http://schemas.microsoft.com/office/drawing/2014/main" xmlns="" id="{62AD9654-DF2E-421E-A21D-3CB31EE7AEC9}"/>
+                  <a16:creationId xmlns="" xmlns:a16="http://schemas.microsoft.com/office/drawing/2014/main" id="{62AD9654-DF2E-421E-A21D-3CB31EE7AEC9}"/>
                 </a:ext>
               </a:extLst>
             </p:cNvPr>
@@ -6620,7 +6274,7 @@
           <p:cNvPr id="21" name="Agrupar 20">
             <a:extLst>
               <a:ext uri="{FF2B5EF4-FFF2-40B4-BE49-F238E27FC236}">
-                <a16:creationId xmlns:a16="http://schemas.microsoft.com/office/drawing/2014/main" xmlns="" id="{742FF697-D3D0-4C6E-A5C8-5AB51DA82FD5}"/>
+                <a16:creationId xmlns="" xmlns:a16="http://schemas.microsoft.com/office/drawing/2014/main" id="{742FF697-D3D0-4C6E-A5C8-5AB51DA82FD5}"/>
               </a:ext>
             </a:extLst>
           </p:cNvPr>
@@ -6640,7 +6294,7 @@
             <p:cNvPr id="20" name="Balão de Fala: Retângulo com Cantos Arredondados 19">
               <a:extLst>
                 <a:ext uri="{FF2B5EF4-FFF2-40B4-BE49-F238E27FC236}">
-                  <a16:creationId xmlns:a16="http://schemas.microsoft.com/office/drawing/2014/main" xmlns="" id="{AA0138DD-E1F7-4726-B5A6-47C288CE6E6A}"/>
+                  <a16:creationId xmlns="" xmlns:a16="http://schemas.microsoft.com/office/drawing/2014/main" id="{AA0138DD-E1F7-4726-B5A6-47C288CE6E6A}"/>
                 </a:ext>
               </a:extLst>
             </p:cNvPr>
@@ -6696,7 +6350,7 @@
             <p:cNvPr id="65" name="Elipse 64">
               <a:extLst>
                 <a:ext uri="{FF2B5EF4-FFF2-40B4-BE49-F238E27FC236}">
-                  <a16:creationId xmlns:a16="http://schemas.microsoft.com/office/drawing/2014/main" xmlns="" id="{2D887CE5-AF78-48D7-81B1-39041528C393}"/>
+                  <a16:creationId xmlns="" xmlns:a16="http://schemas.microsoft.com/office/drawing/2014/main" id="{2D887CE5-AF78-48D7-81B1-39041528C393}"/>
                 </a:ext>
               </a:extLst>
             </p:cNvPr>
@@ -6748,7 +6402,7 @@
             <p:cNvPr id="66" name="Elipse 65">
               <a:extLst>
                 <a:ext uri="{FF2B5EF4-FFF2-40B4-BE49-F238E27FC236}">
-                  <a16:creationId xmlns:a16="http://schemas.microsoft.com/office/drawing/2014/main" xmlns="" id="{E5D2C947-B154-4AD5-B4A9-13A15AFD7A8D}"/>
+                  <a16:creationId xmlns="" xmlns:a16="http://schemas.microsoft.com/office/drawing/2014/main" id="{E5D2C947-B154-4AD5-B4A9-13A15AFD7A8D}"/>
                 </a:ext>
               </a:extLst>
             </p:cNvPr>
@@ -6800,7 +6454,7 @@
             <p:cNvPr id="67" name="Elipse 66">
               <a:extLst>
                 <a:ext uri="{FF2B5EF4-FFF2-40B4-BE49-F238E27FC236}">
-                  <a16:creationId xmlns:a16="http://schemas.microsoft.com/office/drawing/2014/main" xmlns="" id="{5F7F820C-DF66-4663-B1E1-E200E8F489FE}"/>
+                  <a16:creationId xmlns="" xmlns:a16="http://schemas.microsoft.com/office/drawing/2014/main" id="{5F7F820C-DF66-4663-B1E1-E200E8F489FE}"/>
                 </a:ext>
               </a:extLst>
             </p:cNvPr>
@@ -6853,7 +6507,7 @@
           <p:cNvPr id="86" name="Agrupar 85">
             <a:extLst>
               <a:ext uri="{FF2B5EF4-FFF2-40B4-BE49-F238E27FC236}">
-                <a16:creationId xmlns:a16="http://schemas.microsoft.com/office/drawing/2014/main" xmlns="" id="{731157D7-3F7B-494D-A876-4E1B0923940C}"/>
+                <a16:creationId xmlns="" xmlns:a16="http://schemas.microsoft.com/office/drawing/2014/main" id="{731157D7-3F7B-494D-A876-4E1B0923940C}"/>
               </a:ext>
             </a:extLst>
           </p:cNvPr>
@@ -6873,7 +6527,7 @@
             <p:cNvPr id="83" name="Forma Livre: Forma 82">
               <a:extLst>
                 <a:ext uri="{FF2B5EF4-FFF2-40B4-BE49-F238E27FC236}">
-                  <a16:creationId xmlns:a16="http://schemas.microsoft.com/office/drawing/2014/main" xmlns="" id="{8C6FF509-5334-4779-858A-CBA417C36708}"/>
+                  <a16:creationId xmlns="" xmlns:a16="http://schemas.microsoft.com/office/drawing/2014/main" id="{8C6FF509-5334-4779-858A-CBA417C36708}"/>
                 </a:ext>
               </a:extLst>
             </p:cNvPr>
@@ -7026,7 +6680,7 @@
             <p:cNvPr id="84" name="Agrupar 83">
               <a:extLst>
                 <a:ext uri="{FF2B5EF4-FFF2-40B4-BE49-F238E27FC236}">
-                  <a16:creationId xmlns:a16="http://schemas.microsoft.com/office/drawing/2014/main" xmlns="" id="{67688334-9D02-4298-8525-206660E1862D}"/>
+                  <a16:creationId xmlns="" xmlns:a16="http://schemas.microsoft.com/office/drawing/2014/main" id="{67688334-9D02-4298-8525-206660E1862D}"/>
                 </a:ext>
               </a:extLst>
             </p:cNvPr>
@@ -7046,7 +6700,7 @@
               <p:cNvPr id="85" name="Forma Livre: Forma 84">
                 <a:extLst>
                   <a:ext uri="{FF2B5EF4-FFF2-40B4-BE49-F238E27FC236}">
-                    <a16:creationId xmlns:a16="http://schemas.microsoft.com/office/drawing/2014/main" xmlns="" id="{E857EC4A-79A6-4FBC-ADA5-4737D96C5E20}"/>
+                    <a16:creationId xmlns="" xmlns:a16="http://schemas.microsoft.com/office/drawing/2014/main" id="{E857EC4A-79A6-4FBC-ADA5-4737D96C5E20}"/>
                   </a:ext>
                 </a:extLst>
               </p:cNvPr>
@@ -7143,7 +6797,7 @@
               <p:cNvPr id="74" name="Elipse 73">
                 <a:extLst>
                   <a:ext uri="{FF2B5EF4-FFF2-40B4-BE49-F238E27FC236}">
-                    <a16:creationId xmlns:a16="http://schemas.microsoft.com/office/drawing/2014/main" xmlns="" id="{39879178-4A4B-49AA-B47C-DCEE30D0375B}"/>
+                    <a16:creationId xmlns="" xmlns:a16="http://schemas.microsoft.com/office/drawing/2014/main" id="{39879178-4A4B-49AA-B47C-DCEE30D0375B}"/>
                   </a:ext>
                 </a:extLst>
               </p:cNvPr>
@@ -7195,7 +6849,7 @@
               <p:cNvPr id="75" name="Retângulo 74">
                 <a:extLst>
                   <a:ext uri="{FF2B5EF4-FFF2-40B4-BE49-F238E27FC236}">
-                    <a16:creationId xmlns:a16="http://schemas.microsoft.com/office/drawing/2014/main" xmlns="" id="{B131F4CB-B08E-4E9F-917D-5578F7DA570E}"/>
+                    <a16:creationId xmlns="" xmlns:a16="http://schemas.microsoft.com/office/drawing/2014/main" id="{B131F4CB-B08E-4E9F-917D-5578F7DA570E}"/>
                   </a:ext>
                 </a:extLst>
               </p:cNvPr>
@@ -7244,6 +6898,396 @@
           </p:sp>
         </p:grpSp>
       </p:grpSp>
+      <p:sp>
+        <p:nvSpPr>
+          <p:cNvPr id="62" name="Retângulo 61"/>
+          <p:cNvSpPr/>
+          <p:nvPr/>
+        </p:nvSpPr>
+        <p:spPr>
+          <a:xfrm>
+            <a:off x="2854683" y="257459"/>
+            <a:ext cx="1447616" cy="1447616"/>
+          </a:xfrm>
+          <a:prstGeom prst="rect">
+            <a:avLst/>
+          </a:prstGeom>
+          <a:noFill/>
+          <a:ln>
+            <a:noFill/>
+          </a:ln>
+        </p:spPr>
+        <p:style>
+          <a:lnRef idx="2">
+            <a:schemeClr val="accent1">
+              <a:shade val="50000"/>
+            </a:schemeClr>
+          </a:lnRef>
+          <a:fillRef idx="1">
+            <a:schemeClr val="accent1"/>
+          </a:fillRef>
+          <a:effectRef idx="0">
+            <a:schemeClr val="accent1"/>
+          </a:effectRef>
+          <a:fontRef idx="minor">
+            <a:schemeClr val="lt1"/>
+          </a:fontRef>
+        </p:style>
+        <p:txBody>
+          <a:bodyPr rtlCol="0" anchor="ctr"/>
+          <a:lstStyle/>
+          <a:p>
+            <a:pPr algn="ctr"/>
+            <a:endParaRPr lang="pt-BR" dirty="0"/>
+          </a:p>
+        </p:txBody>
+      </p:sp>
+      <p:sp>
+        <p:nvSpPr>
+          <p:cNvPr id="12" name="Estrela de 5 pontas 11"/>
+          <p:cNvSpPr/>
+          <p:nvPr/>
+        </p:nvSpPr>
+        <p:spPr>
+          <a:xfrm>
+            <a:off x="-324544" y="1132395"/>
+            <a:ext cx="1145359" cy="1145359"/>
+          </a:xfrm>
+          <a:prstGeom prst="star5">
+            <a:avLst>
+              <a:gd name="adj" fmla="val 18934"/>
+              <a:gd name="hf" fmla="val 105146"/>
+              <a:gd name="vf" fmla="val 110557"/>
+            </a:avLst>
+          </a:prstGeom>
+          <a:solidFill>
+            <a:srgbClr val="F6E612"/>
+          </a:solidFill>
+          <a:ln w="28575">
+            <a:noFill/>
+          </a:ln>
+          <a:effectLst/>
+        </p:spPr>
+        <p:style>
+          <a:lnRef idx="2">
+            <a:schemeClr val="accent1">
+              <a:shade val="50000"/>
+            </a:schemeClr>
+          </a:lnRef>
+          <a:fillRef idx="1">
+            <a:schemeClr val="accent1"/>
+          </a:fillRef>
+          <a:effectRef idx="0">
+            <a:schemeClr val="accent1"/>
+          </a:effectRef>
+          <a:fontRef idx="minor">
+            <a:schemeClr val="lt1"/>
+          </a:fontRef>
+        </p:style>
+        <p:txBody>
+          <a:bodyPr rtlCol="0" anchor="ctr"/>
+          <a:lstStyle/>
+          <a:p>
+            <a:pPr algn="ctr"/>
+            <a:r>
+              <a:rPr lang="pt-BR" u="sng" dirty="0"/>
+              <a:t> </a:t>
+            </a:r>
+          </a:p>
+        </p:txBody>
+      </p:sp>
+      <p:grpSp>
+        <p:nvGrpSpPr>
+          <p:cNvPr id="11" name="Grupo 10"/>
+          <p:cNvGrpSpPr/>
+          <p:nvPr/>
+        </p:nvGrpSpPr>
+        <p:grpSpPr>
+          <a:xfrm>
+            <a:off x="1045177" y="257459"/>
+            <a:ext cx="1001883" cy="1151589"/>
+            <a:chOff x="3005826" y="1484784"/>
+            <a:chExt cx="3132348" cy="3600400"/>
+          </a:xfrm>
+        </p:grpSpPr>
+        <p:sp>
+          <p:nvSpPr>
+            <p:cNvPr id="8" name="Elipse 7"/>
+            <p:cNvSpPr/>
+            <p:nvPr/>
+          </p:nvSpPr>
+          <p:spPr>
+            <a:xfrm>
+              <a:off x="4031940" y="4005064"/>
+              <a:ext cx="1080120" cy="1080120"/>
+            </a:xfrm>
+            <a:prstGeom prst="ellipse">
+              <a:avLst/>
+            </a:prstGeom>
+            <a:solidFill>
+              <a:srgbClr val="FFA401"/>
+            </a:solidFill>
+            <a:ln>
+              <a:noFill/>
+            </a:ln>
+          </p:spPr>
+          <p:style>
+            <a:lnRef idx="2">
+              <a:schemeClr val="accent1">
+                <a:shade val="50000"/>
+              </a:schemeClr>
+            </a:lnRef>
+            <a:fillRef idx="1">
+              <a:schemeClr val="accent1"/>
+            </a:fillRef>
+            <a:effectRef idx="0">
+              <a:schemeClr val="accent1"/>
+            </a:effectRef>
+            <a:fontRef idx="minor">
+              <a:schemeClr val="lt1"/>
+            </a:fontRef>
+          </p:style>
+          <p:txBody>
+            <a:bodyPr rtlCol="0" anchor="ctr"/>
+            <a:lstStyle/>
+            <a:p>
+              <a:pPr algn="ctr"/>
+              <a:endParaRPr lang="pt-BR"/>
+            </a:p>
+          </p:txBody>
+        </p:sp>
+        <p:sp>
+          <p:nvSpPr>
+            <p:cNvPr id="6" name="Retângulo de cantos arredondados 5"/>
+            <p:cNvSpPr/>
+            <p:nvPr/>
+          </p:nvSpPr>
+          <p:spPr>
+            <a:xfrm>
+              <a:off x="4247964" y="1484784"/>
+              <a:ext cx="648072" cy="850595"/>
+            </a:xfrm>
+            <a:prstGeom prst="roundRect">
+              <a:avLst>
+                <a:gd name="adj" fmla="val 50000"/>
+              </a:avLst>
+            </a:prstGeom>
+            <a:solidFill>
+              <a:schemeClr val="bg1">
+                <a:lumMod val="75000"/>
+              </a:schemeClr>
+            </a:solidFill>
+            <a:ln>
+              <a:noFill/>
+            </a:ln>
+          </p:spPr>
+          <p:style>
+            <a:lnRef idx="2">
+              <a:schemeClr val="accent1">
+                <a:shade val="50000"/>
+              </a:schemeClr>
+            </a:lnRef>
+            <a:fillRef idx="1">
+              <a:schemeClr val="accent1"/>
+            </a:fillRef>
+            <a:effectRef idx="0">
+              <a:schemeClr val="accent1"/>
+            </a:effectRef>
+            <a:fontRef idx="minor">
+              <a:schemeClr val="lt1"/>
+            </a:fontRef>
+          </p:style>
+          <p:txBody>
+            <a:bodyPr rtlCol="0" anchor="ctr"/>
+            <a:lstStyle/>
+            <a:p>
+              <a:pPr algn="ctr"/>
+              <a:endParaRPr lang="pt-BR"/>
+            </a:p>
+          </p:txBody>
+        </p:sp>
+        <p:sp>
+          <p:nvSpPr>
+            <p:cNvPr id="5" name="Retângulo de cantos arredondados 4"/>
+            <p:cNvSpPr/>
+            <p:nvPr/>
+          </p:nvSpPr>
+          <p:spPr>
+            <a:xfrm>
+              <a:off x="3419872" y="1772816"/>
+              <a:ext cx="2304255" cy="2772309"/>
+            </a:xfrm>
+            <a:custGeom>
+              <a:avLst/>
+              <a:gdLst/>
+              <a:ahLst/>
+              <a:cxnLst/>
+              <a:rect l="l" t="t" r="r" b="b"/>
+              <a:pathLst>
+                <a:path w="2304256" h="2772308">
+                  <a:moveTo>
+                    <a:pt x="1152128" y="0"/>
+                  </a:moveTo>
+                  <a:cubicBezTo>
+                    <a:pt x="1788431" y="0"/>
+                    <a:pt x="2304256" y="515825"/>
+                    <a:pt x="2304256" y="1152128"/>
+                  </a:cubicBezTo>
+                  <a:lnTo>
+                    <a:pt x="2304256" y="1872208"/>
+                  </a:lnTo>
+                  <a:cubicBezTo>
+                    <a:pt x="2304256" y="2236762"/>
+                    <a:pt x="2134940" y="2561771"/>
+                    <a:pt x="1870196" y="2772308"/>
+                  </a:cubicBezTo>
+                  <a:lnTo>
+                    <a:pt x="434061" y="2772308"/>
+                  </a:lnTo>
+                  <a:cubicBezTo>
+                    <a:pt x="169317" y="2561771"/>
+                    <a:pt x="0" y="2236762"/>
+                    <a:pt x="0" y="1872208"/>
+                  </a:cubicBezTo>
+                  <a:lnTo>
+                    <a:pt x="0" y="1152128"/>
+                  </a:lnTo>
+                  <a:cubicBezTo>
+                    <a:pt x="0" y="515825"/>
+                    <a:pt x="515825" y="0"/>
+                    <a:pt x="1152128" y="0"/>
+                  </a:cubicBezTo>
+                  <a:close/>
+                </a:path>
+              </a:pathLst>
+            </a:custGeom>
+            <a:solidFill>
+              <a:srgbClr val="FFB52F"/>
+            </a:solidFill>
+            <a:ln>
+              <a:noFill/>
+            </a:ln>
+          </p:spPr>
+          <p:style>
+            <a:lnRef idx="2">
+              <a:schemeClr val="accent1">
+                <a:shade val="50000"/>
+              </a:schemeClr>
+            </a:lnRef>
+            <a:fillRef idx="1">
+              <a:schemeClr val="accent1"/>
+            </a:fillRef>
+            <a:effectRef idx="0">
+              <a:schemeClr val="accent1"/>
+            </a:effectRef>
+            <a:fontRef idx="minor">
+              <a:schemeClr val="lt1"/>
+            </a:fontRef>
+          </p:style>
+          <p:txBody>
+            <a:bodyPr rtlCol="0" anchor="ctr"/>
+            <a:lstStyle/>
+            <a:p>
+              <a:pPr algn="ctr"/>
+              <a:endParaRPr lang="pt-BR"/>
+            </a:p>
+          </p:txBody>
+        </p:sp>
+        <p:sp>
+          <p:nvSpPr>
+            <p:cNvPr id="7" name="Triângulo isósceles 6"/>
+            <p:cNvSpPr/>
+            <p:nvPr/>
+          </p:nvSpPr>
+          <p:spPr>
+            <a:xfrm>
+              <a:off x="3005826" y="1916832"/>
+              <a:ext cx="3132348" cy="2700300"/>
+            </a:xfrm>
+            <a:prstGeom prst="triangle">
+              <a:avLst/>
+            </a:prstGeom>
+            <a:solidFill>
+              <a:srgbClr val="FFB52F"/>
+            </a:solidFill>
+            <a:ln>
+              <a:noFill/>
+            </a:ln>
+          </p:spPr>
+          <p:style>
+            <a:lnRef idx="2">
+              <a:schemeClr val="accent1">
+                <a:shade val="50000"/>
+              </a:schemeClr>
+            </a:lnRef>
+            <a:fillRef idx="1">
+              <a:schemeClr val="accent1"/>
+            </a:fillRef>
+            <a:effectRef idx="0">
+              <a:schemeClr val="accent1"/>
+            </a:effectRef>
+            <a:fontRef idx="minor">
+              <a:schemeClr val="lt1"/>
+            </a:fontRef>
+          </p:style>
+          <p:txBody>
+            <a:bodyPr rtlCol="0" anchor="ctr"/>
+            <a:lstStyle/>
+            <a:p>
+              <a:pPr algn="ctr"/>
+              <a:endParaRPr lang="pt-BR"/>
+            </a:p>
+          </p:txBody>
+        </p:sp>
+        <p:sp>
+          <p:nvSpPr>
+            <p:cNvPr id="9" name="Retângulo de cantos arredondados 8"/>
+            <p:cNvSpPr/>
+            <p:nvPr/>
+          </p:nvSpPr>
+          <p:spPr>
+            <a:xfrm>
+              <a:off x="5086931" y="2553207"/>
+              <a:ext cx="358440" cy="1008112"/>
+            </a:xfrm>
+            <a:prstGeom prst="roundRect">
+              <a:avLst>
+                <a:gd name="adj" fmla="val 50000"/>
+              </a:avLst>
+            </a:prstGeom>
+            <a:solidFill>
+              <a:srgbClr val="F1EBA1"/>
+            </a:solidFill>
+            <a:ln>
+              <a:noFill/>
+            </a:ln>
+          </p:spPr>
+          <p:style>
+            <a:lnRef idx="2">
+              <a:schemeClr val="accent1">
+                <a:shade val="50000"/>
+              </a:schemeClr>
+            </a:lnRef>
+            <a:fillRef idx="1">
+              <a:schemeClr val="accent1"/>
+            </a:fillRef>
+            <a:effectRef idx="0">
+              <a:schemeClr val="accent1"/>
+            </a:effectRef>
+            <a:fontRef idx="minor">
+              <a:schemeClr val="lt1"/>
+            </a:fontRef>
+          </p:style>
+          <p:txBody>
+            <a:bodyPr rtlCol="0" anchor="ctr"/>
+            <a:lstStyle/>
+            <a:p>
+              <a:pPr algn="ctr"/>
+              <a:endParaRPr lang="pt-BR"/>
+            </a:p>
+          </p:txBody>
+        </p:sp>
+      </p:grpSp>
     </p:spTree>
     <p:extLst>
       <p:ext uri="{BB962C8B-B14F-4D97-AF65-F5344CB8AC3E}">
@@ -7286,7 +7330,7 @@
           <p:cNvPr id="3" name="Imagem 2" descr="Uma imagem contendo brinquedo, gráficos vetoriais&#10;&#10;Descrição gerada automaticamente">
             <a:extLst>
               <a:ext uri="{FF2B5EF4-FFF2-40B4-BE49-F238E27FC236}">
-                <a16:creationId xmlns:a16="http://schemas.microsoft.com/office/drawing/2014/main" xmlns="" id="{D62FA05A-5510-46A9-B25F-40C0074A1B04}"/>
+                <a16:creationId xmlns="" xmlns:a16="http://schemas.microsoft.com/office/drawing/2014/main" id="{D62FA05A-5510-46A9-B25F-40C0074A1B04}"/>
               </a:ext>
             </a:extLst>
           </p:cNvPr>

</xml_diff>